<commit_message>
Agrega curvas INL y DNL
.
</commit_message>
<xml_diff>
--- a/Diapositivas/DesignExampleRun_CurrentSteeringDAC.pptx
+++ b/Diapositivas/DesignExampleRun_CurrentSteeringDAC.pptx
@@ -5,7 +5,7 @@
     <p:sldMasterId id="2147483648" r:id="rId1"/>
   </p:sldMasterIdLst>
   <p:notesMasterIdLst>
-    <p:notesMasterId r:id="rId9"/>
+    <p:notesMasterId r:id="rId10"/>
   </p:notesMasterIdLst>
   <p:sldIdLst>
     <p:sldId id="269" r:id="rId2"/>
@@ -15,6 +15,7 @@
     <p:sldId id="261" r:id="rId6"/>
     <p:sldId id="259" r:id="rId7"/>
     <p:sldId id="266" r:id="rId8"/>
+    <p:sldId id="270" r:id="rId9"/>
   </p:sldIdLst>
   <p:sldSz cx="12192000" cy="6858000"/>
   <p:notesSz cx="6858000" cy="9144000"/>
@@ -4769,6 +4770,228 @@
     <p:extLst>
       <p:ext uri="{BB962C8B-B14F-4D97-AF65-F5344CB8AC3E}">
         <p14:creationId xmlns:p14="http://schemas.microsoft.com/office/powerpoint/2010/main" val="114860447"/>
+      </p:ext>
+    </p:extLst>
+  </p:cSld>
+  <p:clrMapOvr>
+    <a:masterClrMapping/>
+  </p:clrMapOvr>
+</p:sld>
+</file>
+
+<file path=ppt/slides/slide8.xml><?xml version="1.0" encoding="utf-8"?>
+<p:sld xmlns:a="http://schemas.openxmlformats.org/drawingml/2006/main" xmlns:r="http://schemas.openxmlformats.org/officeDocument/2006/relationships" xmlns:p="http://schemas.openxmlformats.org/presentationml/2006/main">
+  <p:cSld>
+    <p:spTree>
+      <p:nvGrpSpPr>
+        <p:cNvPr id="1" name=""/>
+        <p:cNvGrpSpPr/>
+        <p:nvPr/>
+      </p:nvGrpSpPr>
+      <p:grpSpPr>
+        <a:xfrm>
+          <a:off x="0" y="0"/>
+          <a:ext cx="0" cy="0"/>
+          <a:chOff x="0" y="0"/>
+          <a:chExt cx="0" cy="0"/>
+        </a:xfrm>
+      </p:grpSpPr>
+      <p:sp>
+        <p:nvSpPr>
+          <p:cNvPr id="2" name="CuadroTexto 1">
+            <a:extLst>
+              <a:ext uri="{FF2B5EF4-FFF2-40B4-BE49-F238E27FC236}">
+                <a16:creationId xmlns:a16="http://schemas.microsoft.com/office/drawing/2014/main" id="{A7A6BB4C-C93D-C1D2-419E-82C2D8558645}"/>
+              </a:ext>
+            </a:extLst>
+          </p:cNvPr>
+          <p:cNvSpPr txBox="1"/>
+          <p:nvPr/>
+        </p:nvSpPr>
+        <p:spPr>
+          <a:xfrm>
+            <a:off x="4032070" y="402535"/>
+            <a:ext cx="4044697" cy="369332"/>
+          </a:xfrm>
+          <a:prstGeom prst="rect">
+            <a:avLst/>
+          </a:prstGeom>
+          <a:noFill/>
+        </p:spPr>
+        <p:txBody>
+          <a:bodyPr wrap="none" rtlCol="0">
+            <a:spAutoFit/>
+          </a:bodyPr>
+          <a:lstStyle/>
+          <a:p>
+            <a:r>
+              <a:rPr lang="en-US" b="1" dirty="0" smtClean="0"/>
+              <a:t>Linearity measurement</a:t>
+            </a:r>
+            <a:r>
+              <a:rPr lang="en-US" b="1" dirty="0" smtClean="0"/>
+              <a:t> curves</a:t>
+            </a:r>
+            <a:endParaRPr lang="en-US" b="1" dirty="0"/>
+          </a:p>
+        </p:txBody>
+      </p:sp>
+      <p:pic>
+        <p:nvPicPr>
+          <p:cNvPr id="3" name="Imagen 2"/>
+          <p:cNvPicPr>
+            <a:picLocks noChangeAspect="1"/>
+          </p:cNvPicPr>
+          <p:nvPr/>
+        </p:nvPicPr>
+        <p:blipFill>
+          <a:blip r:embed="rId2" cstate="hqprint">
+            <a:extLst>
+              <a:ext uri="{28A0092B-C50C-407E-A947-70E740481C1C}">
+                <a14:useLocalDpi xmlns:a14="http://schemas.microsoft.com/office/drawing/2010/main" val="0"/>
+              </a:ext>
+            </a:extLst>
+          </a:blip>
+          <a:stretch>
+            <a:fillRect/>
+          </a:stretch>
+        </p:blipFill>
+        <p:spPr>
+          <a:xfrm>
+            <a:off x="353360" y="872194"/>
+            <a:ext cx="5349435" cy="2674718"/>
+          </a:xfrm>
+          <a:prstGeom prst="rect">
+            <a:avLst/>
+          </a:prstGeom>
+        </p:spPr>
+      </p:pic>
+      <p:pic>
+        <p:nvPicPr>
+          <p:cNvPr id="5" name="Imagen 4"/>
+          <p:cNvPicPr>
+            <a:picLocks noChangeAspect="1"/>
+          </p:cNvPicPr>
+          <p:nvPr/>
+        </p:nvPicPr>
+        <p:blipFill>
+          <a:blip r:embed="rId3" cstate="hqprint">
+            <a:extLst>
+              <a:ext uri="{28A0092B-C50C-407E-A947-70E740481C1C}">
+                <a14:useLocalDpi xmlns:a14="http://schemas.microsoft.com/office/drawing/2010/main" val="0"/>
+              </a:ext>
+            </a:extLst>
+          </a:blip>
+          <a:stretch>
+            <a:fillRect/>
+          </a:stretch>
+        </p:blipFill>
+        <p:spPr>
+          <a:xfrm>
+            <a:off x="222731" y="3546912"/>
+            <a:ext cx="5468097" cy="2734049"/>
+          </a:xfrm>
+          <a:prstGeom prst="rect">
+            <a:avLst/>
+          </a:prstGeom>
+        </p:spPr>
+      </p:pic>
+      <p:pic>
+        <p:nvPicPr>
+          <p:cNvPr id="6" name="Imagen 5"/>
+          <p:cNvPicPr>
+            <a:picLocks noChangeAspect="1"/>
+          </p:cNvPicPr>
+          <p:nvPr/>
+        </p:nvPicPr>
+        <p:blipFill>
+          <a:blip r:embed="rId4" cstate="hqprint">
+            <a:extLst>
+              <a:ext uri="{28A0092B-C50C-407E-A947-70E740481C1C}">
+                <a14:useLocalDpi xmlns:a14="http://schemas.microsoft.com/office/drawing/2010/main" val="0"/>
+              </a:ext>
+            </a:extLst>
+          </a:blip>
+          <a:stretch>
+            <a:fillRect/>
+          </a:stretch>
+        </p:blipFill>
+        <p:spPr>
+          <a:xfrm>
+            <a:off x="5730744" y="872194"/>
+            <a:ext cx="5484061" cy="3133749"/>
+          </a:xfrm>
+          <a:prstGeom prst="rect">
+            <a:avLst/>
+          </a:prstGeom>
+        </p:spPr>
+      </p:pic>
+      <p:sp>
+        <p:nvSpPr>
+          <p:cNvPr id="7" name="CuadroTexto 6">
+            <a:extLst>
+              <a:ext uri="{FF2B5EF4-FFF2-40B4-BE49-F238E27FC236}">
+                <a16:creationId xmlns:a16="http://schemas.microsoft.com/office/drawing/2014/main" id="{A7A6BB4C-C93D-C1D2-419E-82C2D8558645}"/>
+              </a:ext>
+            </a:extLst>
+          </p:cNvPr>
+          <p:cNvSpPr txBox="1"/>
+          <p:nvPr/>
+        </p:nvSpPr>
+        <p:spPr>
+          <a:xfrm>
+            <a:off x="6054418" y="4834109"/>
+            <a:ext cx="5160387" cy="923330"/>
+          </a:xfrm>
+          <a:prstGeom prst="rect">
+            <a:avLst/>
+          </a:prstGeom>
+          <a:noFill/>
+        </p:spPr>
+        <p:txBody>
+          <a:bodyPr wrap="none" rtlCol="0">
+            <a:spAutoFit/>
+          </a:bodyPr>
+          <a:lstStyle/>
+          <a:p>
+            <a:pPr marL="285750" indent="-285750">
+              <a:buFont typeface="Arial" panose="020B0604020202020204" pitchFamily="34" charset="0"/>
+              <a:buChar char="•"/>
+            </a:pPr>
+            <a:r>
+              <a:rPr lang="en-US" b="1" dirty="0"/>
+              <a:t>These results are preliminary and </a:t>
+            </a:r>
+            <a:endParaRPr lang="en-US" b="1" dirty="0" smtClean="0"/>
+          </a:p>
+          <a:p>
+            <a:r>
+              <a:rPr lang="en-US" b="1" dirty="0" smtClean="0"/>
+              <a:t>are </a:t>
+            </a:r>
+            <a:r>
+              <a:rPr lang="en-US" b="1" dirty="0"/>
+              <a:t>planned to be improved through </a:t>
+            </a:r>
+            <a:endParaRPr lang="en-US" b="1" dirty="0" smtClean="0"/>
+          </a:p>
+          <a:p>
+            <a:r>
+              <a:rPr lang="en-US" b="1" dirty="0" smtClean="0"/>
+              <a:t>a </a:t>
+            </a:r>
+            <a:r>
+              <a:rPr lang="en-US" b="1" dirty="0"/>
+              <a:t>more robust design.</a:t>
+            </a:r>
+            <a:endParaRPr lang="en-US" b="1" dirty="0"/>
+          </a:p>
+        </p:txBody>
+      </p:sp>
+    </p:spTree>
+    <p:extLst>
+      <p:ext uri="{BB962C8B-B14F-4D97-AF65-F5344CB8AC3E}">
+        <p14:creationId xmlns:p14="http://schemas.microsoft.com/office/powerpoint/2010/main" val="2472044696"/>
       </p:ext>
     </p:extLst>
   </p:cSld>

</xml_diff>

<commit_message>
Agrega las ultimas modificaciones
</commit_message>
<xml_diff>
--- a/Diapositivas/DesignExampleRun_CurrentSteeringDAC.pptx
+++ b/Diapositivas/DesignExampleRun_CurrentSteeringDAC.pptx
@@ -3794,13 +3794,22 @@
               </a:rPr>
             </a:br>
             <a:r>
+              <a:rPr lang="en-US" sz="4000" dirty="0" smtClean="0">
+                <a:solidFill>
+                  <a:srgbClr val="000000"/>
+                </a:solidFill>
+                <a:latin typeface="PT Sans Narrow" panose="020B0506020203020204" pitchFamily="34" charset="0"/>
+              </a:rPr>
+              <a:t>W-2W Current </a:t>
+            </a:r>
+            <a:r>
               <a:rPr lang="en-US" sz="4000" dirty="0">
                 <a:solidFill>
                   <a:srgbClr val="000000"/>
                 </a:solidFill>
                 <a:latin typeface="PT Sans Narrow" panose="020B0506020203020204" pitchFamily="34" charset="0"/>
               </a:rPr>
-              <a:t>W-2WCurrent Steering DAC</a:t>
+              <a:t>Steering DAC</a:t>
             </a:r>
             <a:r>
               <a:rPr lang="en-US" sz="4000" b="0" i="0" u="none" strike="noStrike" noProof="0" dirty="0">
@@ -4826,11 +4835,7 @@
           <a:p>
             <a:r>
               <a:rPr lang="en-US" b="1" dirty="0" smtClean="0"/>
-              <a:t>Linearity measurement</a:t>
-            </a:r>
-            <a:r>
-              <a:rPr lang="en-US" b="1" dirty="0" smtClean="0"/>
-              <a:t> curves</a:t>
+              <a:t>Linearity measurement curves</a:t>
             </a:r>
             <a:endParaRPr lang="en-US" b="1" dirty="0"/>
           </a:p>
@@ -4984,7 +4989,6 @@
               <a:rPr lang="en-US" b="1" dirty="0"/>
               <a:t>more robust design.</a:t>
             </a:r>
-            <a:endParaRPr lang="en-US" b="1" dirty="0"/>
           </a:p>
         </p:txBody>
       </p:sp>

</xml_diff>